<commit_message>
alot of final doc
</commit_message>
<xml_diff>
--- a/技术交流报告.pptx
+++ b/技术交流报告.pptx
@@ -286,7 +286,7 @@
           <a:p>
             <a:fld id="{DE75668F-B37B-164D-A62C-3FF5A8BC808F}" type="datetimeFigureOut">
               <a:rPr lang="en-US" smtClean="0"/>
-              <a:t>8/14/22</a:t>
+              <a:t>8/15/22</a:t>
             </a:fld>
             <a:endParaRPr lang="en-US"/>
           </a:p>
@@ -3840,7 +3840,7 @@
           <a:p>
             <a:fld id="{CE875574-B30F-E946-8A30-5D40B09C42BE}" type="datetimeFigureOut">
               <a:rPr lang="en-US" smtClean="0"/>
-              <a:t>8/14/22</a:t>
+              <a:t>8/15/22</a:t>
             </a:fld>
             <a:endParaRPr lang="en-US"/>
           </a:p>
@@ -4005,7 +4005,7 @@
           <a:p>
             <a:fld id="{CE875574-B30F-E946-8A30-5D40B09C42BE}" type="datetimeFigureOut">
               <a:rPr lang="en-US" smtClean="0"/>
-              <a:t>8/14/22</a:t>
+              <a:t>8/15/22</a:t>
             </a:fld>
             <a:endParaRPr lang="en-US"/>
           </a:p>
@@ -4180,7 +4180,7 @@
           <a:p>
             <a:fld id="{CE875574-B30F-E946-8A30-5D40B09C42BE}" type="datetimeFigureOut">
               <a:rPr lang="en-US" smtClean="0"/>
-              <a:t>8/14/22</a:t>
+              <a:t>8/15/22</a:t>
             </a:fld>
             <a:endParaRPr lang="en-US"/>
           </a:p>
@@ -4420,7 +4420,7 @@
           <a:p>
             <a:fld id="{CE875574-B30F-E946-8A30-5D40B09C42BE}" type="datetimeFigureOut">
               <a:rPr lang="en-US" smtClean="0"/>
-              <a:t>8/14/22</a:t>
+              <a:t>8/15/22</a:t>
             </a:fld>
             <a:endParaRPr lang="en-US"/>
           </a:p>
@@ -4661,7 +4661,7 @@
           <a:p>
             <a:fld id="{CE875574-B30F-E946-8A30-5D40B09C42BE}" type="datetimeFigureOut">
               <a:rPr lang="en-US" smtClean="0"/>
-              <a:t>8/14/22</a:t>
+              <a:t>8/15/22</a:t>
             </a:fld>
             <a:endParaRPr lang="en-US"/>
           </a:p>
@@ -4888,7 +4888,7 @@
           <a:p>
             <a:fld id="{CE875574-B30F-E946-8A30-5D40B09C42BE}" type="datetimeFigureOut">
               <a:rPr lang="en-US" smtClean="0"/>
-              <a:t>8/14/22</a:t>
+              <a:t>8/15/22</a:t>
             </a:fld>
             <a:endParaRPr lang="en-US"/>
           </a:p>
@@ -5250,7 +5250,7 @@
           <a:p>
             <a:fld id="{CE875574-B30F-E946-8A30-5D40B09C42BE}" type="datetimeFigureOut">
               <a:rPr lang="en-US" smtClean="0"/>
-              <a:t>8/14/22</a:t>
+              <a:t>8/15/22</a:t>
             </a:fld>
             <a:endParaRPr lang="en-US"/>
           </a:p>
@@ -5363,7 +5363,7 @@
           <a:p>
             <a:fld id="{CE875574-B30F-E946-8A30-5D40B09C42BE}" type="datetimeFigureOut">
               <a:rPr lang="en-US" smtClean="0"/>
-              <a:t>8/14/22</a:t>
+              <a:t>8/15/22</a:t>
             </a:fld>
             <a:endParaRPr lang="en-US"/>
           </a:p>
@@ -5453,7 +5453,7 @@
           <a:p>
             <a:fld id="{CE875574-B30F-E946-8A30-5D40B09C42BE}" type="datetimeFigureOut">
               <a:rPr lang="en-US" smtClean="0"/>
-              <a:t>8/14/22</a:t>
+              <a:t>8/15/22</a:t>
             </a:fld>
             <a:endParaRPr lang="en-US"/>
           </a:p>
@@ -5725,7 +5725,7 @@
           <a:p>
             <a:fld id="{CE875574-B30F-E946-8A30-5D40B09C42BE}" type="datetimeFigureOut">
               <a:rPr lang="en-US" smtClean="0"/>
-              <a:t>8/14/22</a:t>
+              <a:t>8/15/22</a:t>
             </a:fld>
             <a:endParaRPr lang="en-US"/>
           </a:p>
@@ -5977,7 +5977,7 @@
           <a:p>
             <a:fld id="{CE875574-B30F-E946-8A30-5D40B09C42BE}" type="datetimeFigureOut">
               <a:rPr lang="en-US" smtClean="0"/>
-              <a:t>8/14/22</a:t>
+              <a:t>8/15/22</a:t>
             </a:fld>
             <a:endParaRPr lang="en-US"/>
           </a:p>
@@ -6185,7 +6185,7 @@
           <a:p>
             <a:fld id="{CE875574-B30F-E946-8A30-5D40B09C42BE}" type="datetimeFigureOut">
               <a:rPr lang="en-US" smtClean="0"/>
-              <a:t>8/14/22</a:t>
+              <a:t>8/15/22</a:t>
             </a:fld>
             <a:endParaRPr lang="en-US"/>
           </a:p>
@@ -24544,7 +24544,7 @@
         <p:spPr>
           <a:xfrm>
             <a:off x="3843377" y="5233290"/>
-            <a:ext cx="1483035" cy="307777"/>
+            <a:ext cx="1506118" cy="307777"/>
           </a:xfrm>
           <a:prstGeom prst="rect">
             <a:avLst/>
@@ -24563,7 +24563,7 @@
                   <a:srgbClr val="7030A0"/>
                 </a:solidFill>
               </a:rPr>
-              <a:t>Io,</a:t>
+              <a:t>IO,</a:t>
             </a:r>
             <a:r>
               <a:rPr kumimoji="1" lang="zh-CN" altLang="en-US" sz="1400" dirty="0">
@@ -24591,7 +24591,7 @@
         <p:spPr>
           <a:xfrm>
             <a:off x="6397234" y="5211221"/>
-            <a:ext cx="1039067" cy="307777"/>
+            <a:ext cx="1066318" cy="307777"/>
           </a:xfrm>
           <a:prstGeom prst="rect">
             <a:avLst/>
@@ -24610,7 +24610,7 @@
                   <a:srgbClr val="7030A0"/>
                 </a:solidFill>
               </a:rPr>
-              <a:t>io</a:t>
+              <a:t>IO</a:t>
             </a:r>
             <a:r>
               <a:rPr kumimoji="1" lang="zh-CN" altLang="en-US" sz="1400" dirty="0">
@@ -26315,11 +26315,14 @@
               <a:t>compute_num</a:t>
             </a:r>
             <a:r>
-              <a:rPr lang="en-US" altLang="zh-CN" sz="2000" dirty="0">
+              <a:rPr lang="en-US" altLang="zh-CN" sz="2000">
                 <a:sym typeface="+mn-ea"/>
               </a:rPr>
-              <a:t>=10000</a:t>
-            </a:r>
+              <a:t>=1000</a:t>
+            </a:r>
+            <a:endParaRPr lang="en-US" altLang="zh-CN" sz="2000" dirty="0">
+              <a:sym typeface="+mn-ea"/>
+            </a:endParaRPr>
           </a:p>
           <a:p>
             <a:pPr lvl="1"/>
@@ -26606,7 +26609,7 @@
                     <a:lstStyle/>
                     <a:p>
                       <a:r>
-                        <a:rPr lang="en-US" altLang="zh-CN"/>
+                        <a:rPr lang="en-US" altLang="zh-CN" dirty="0"/>
                         <a:t>3580</a:t>
                       </a:r>
                       <a:endParaRPr lang="zh-CN" altLang="en-US" dirty="0"/>

</xml_diff>